<commit_message>
updated the shibir resources
</commit_message>
<xml_diff>
--- a/docs/VSS2025 countrywise pre-shibir orientation.pptx
+++ b/docs/VSS2025 countrywise pre-shibir orientation.pptx
@@ -110,13 +110,18 @@
       </a:defRPr>
     </a:lvl9pPr>
   </p:defaultTextStyle>
+  <p:extLst>
+    <p:ext uri="{EFAFB233-063F-42B5-8137-9DF3F51BA10A}">
+      <p15:sldGuideLst xmlns:p15="http://schemas.microsoft.com/office/powerpoint/2012/main"/>
+    </p:ext>
+  </p:extLst>
 </p:presentation>
 </file>
 
 <file path=ppt/revisionInfo.xml><?xml version="1.0" encoding="utf-8"?>
 <p1510:revInfo xmlns:a="http://schemas.openxmlformats.org/drawingml/2006/main" xmlns:r="http://schemas.openxmlformats.org/officeDocument/2006/relationships" xmlns:p1510="http://schemas.microsoft.com/office/powerpoint/2015/10/main">
   <p1510:revLst>
-    <p1510:client id="{6CBEA153-263A-4AEE-A97C-DCC3F69A879E}" v="252" dt="2025-11-28T07:25:53.381"/>
+    <p1510:client id="{6CBEA153-263A-4AEE-A97C-DCC3F69A879E}" v="253" dt="2025-12-05T04:31:13.922"/>
   </p1510:revLst>
 </p1510:revInfo>
 </file>
@@ -126,7 +131,7 @@
   <pc:docChgLst>
     <pc:chgData name="Saumitra Gokhale" userId="b6a19a222bcc1af9" providerId="LiveId" clId="{E73EE97B-EF70-4C67-A090-E9F4157C8985}"/>
     <pc:docChg chg="undo custSel addSld delSld modSld modMainMaster">
-      <pc:chgData name="Saumitra Gokhale" userId="b6a19a222bcc1af9" providerId="LiveId" clId="{E73EE97B-EF70-4C67-A090-E9F4157C8985}" dt="2025-11-28T07:25:53.381" v="736" actId="20577"/>
+      <pc:chgData name="Saumitra Gokhale" userId="b6a19a222bcc1af9" providerId="LiveId" clId="{E73EE97B-EF70-4C67-A090-E9F4157C8985}" dt="2025-12-05T04:31:27.234" v="1154" actId="14100"/>
       <pc:docMkLst>
         <pc:docMk/>
       </pc:docMkLst>
@@ -144,12 +149,196 @@
           <pc:sldMk cId="858356228" sldId="257"/>
         </pc:sldMkLst>
       </pc:sldChg>
-      <pc:sldChg chg="modTransition">
-        <pc:chgData name="Saumitra Gokhale" userId="b6a19a222bcc1af9" providerId="LiveId" clId="{E73EE97B-EF70-4C67-A090-E9F4157C8985}" dt="2025-11-28T06:46:43.903" v="543"/>
+      <pc:sldChg chg="addSp delSp modSp mod modTransition setBg">
+        <pc:chgData name="Saumitra Gokhale" userId="b6a19a222bcc1af9" providerId="LiveId" clId="{E73EE97B-EF70-4C67-A090-E9F4157C8985}" dt="2025-12-05T04:29:34.809" v="1148" actId="1038"/>
         <pc:sldMkLst>
           <pc:docMk/>
           <pc:sldMk cId="3820380717" sldId="258"/>
         </pc:sldMkLst>
+        <pc:spChg chg="del">
+          <ac:chgData name="Saumitra Gokhale" userId="b6a19a222bcc1af9" providerId="LiveId" clId="{E73EE97B-EF70-4C67-A090-E9F4157C8985}" dt="2025-12-05T04:11:50.694" v="834" actId="478"/>
+          <ac:spMkLst>
+            <pc:docMk/>
+            <pc:sldMk cId="3820380717" sldId="258"/>
+            <ac:spMk id="2" creationId="{40AD334F-5E4D-CF1C-514B-2ABAD736A62A}"/>
+          </ac:spMkLst>
+        </pc:spChg>
+        <pc:spChg chg="add del mod">
+          <ac:chgData name="Saumitra Gokhale" userId="b6a19a222bcc1af9" providerId="LiveId" clId="{E73EE97B-EF70-4C67-A090-E9F4157C8985}" dt="2025-12-05T04:11:57.465" v="835" actId="478"/>
+          <ac:spMkLst>
+            <pc:docMk/>
+            <pc:sldMk cId="3820380717" sldId="258"/>
+            <ac:spMk id="10" creationId="{0EDC42AD-DE31-FE82-52FC-19DF941B8CA5}"/>
+          </ac:spMkLst>
+        </pc:spChg>
+        <pc:spChg chg="add del">
+          <ac:chgData name="Saumitra Gokhale" userId="b6a19a222bcc1af9" providerId="LiveId" clId="{E73EE97B-EF70-4C67-A090-E9F4157C8985}" dt="2025-12-05T04:15:37.116" v="840" actId="26606"/>
+          <ac:spMkLst>
+            <pc:docMk/>
+            <pc:sldMk cId="3820380717" sldId="258"/>
+            <ac:spMk id="19" creationId="{0205D939-00C4-4F2E-9797-3170DD040D90}"/>
+          </ac:spMkLst>
+        </pc:spChg>
+        <pc:spChg chg="add del">
+          <ac:chgData name="Saumitra Gokhale" userId="b6a19a222bcc1af9" providerId="LiveId" clId="{E73EE97B-EF70-4C67-A090-E9F4157C8985}" dt="2025-12-05T04:22:55.100" v="851" actId="26606"/>
+          <ac:spMkLst>
+            <pc:docMk/>
+            <pc:sldMk cId="3820380717" sldId="258"/>
+            <ac:spMk id="20" creationId="{5F9CFCE6-877F-4858-B8BD-2C52CA8AFBC4}"/>
+          </ac:spMkLst>
+        </pc:spChg>
+        <pc:spChg chg="add del">
+          <ac:chgData name="Saumitra Gokhale" userId="b6a19a222bcc1af9" providerId="LiveId" clId="{E73EE97B-EF70-4C67-A090-E9F4157C8985}" dt="2025-12-05T04:15:37.116" v="840" actId="26606"/>
+          <ac:spMkLst>
+            <pc:docMk/>
+            <pc:sldMk cId="3820380717" sldId="258"/>
+            <ac:spMk id="21" creationId="{38EE4E44-1403-472B-8C01-D354CB8F5AE7}"/>
+          </ac:spMkLst>
+        </pc:spChg>
+        <pc:spChg chg="add del">
+          <ac:chgData name="Saumitra Gokhale" userId="b6a19a222bcc1af9" providerId="LiveId" clId="{E73EE97B-EF70-4C67-A090-E9F4157C8985}" dt="2025-12-05T04:22:55.100" v="851" actId="26606"/>
+          <ac:spMkLst>
+            <pc:docMk/>
+            <pc:sldMk cId="3820380717" sldId="258"/>
+            <ac:spMk id="22" creationId="{8213F8A0-12AE-4514-8372-0DD766EC28EE}"/>
+          </ac:spMkLst>
+        </pc:spChg>
+        <pc:spChg chg="add del">
+          <ac:chgData name="Saumitra Gokhale" userId="b6a19a222bcc1af9" providerId="LiveId" clId="{E73EE97B-EF70-4C67-A090-E9F4157C8985}" dt="2025-12-05T04:15:37.116" v="840" actId="26606"/>
+          <ac:spMkLst>
+            <pc:docMk/>
+            <pc:sldMk cId="3820380717" sldId="258"/>
+            <ac:spMk id="23" creationId="{583CCE40-4C5F-42D3-86D9-7892AD1E98E3}"/>
+          </ac:spMkLst>
+        </pc:spChg>
+        <pc:spChg chg="add del">
+          <ac:chgData name="Saumitra Gokhale" userId="b6a19a222bcc1af9" providerId="LiveId" clId="{E73EE97B-EF70-4C67-A090-E9F4157C8985}" dt="2025-12-05T04:22:55.100" v="851" actId="26606"/>
+          <ac:spMkLst>
+            <pc:docMk/>
+            <pc:sldMk cId="3820380717" sldId="258"/>
+            <ac:spMk id="24" creationId="{9EFF17D4-9A8C-4CE5-B096-D8CCD4400437}"/>
+          </ac:spMkLst>
+        </pc:spChg>
+        <pc:spChg chg="add del">
+          <ac:chgData name="Saumitra Gokhale" userId="b6a19a222bcc1af9" providerId="LiveId" clId="{E73EE97B-EF70-4C67-A090-E9F4157C8985}" dt="2025-12-05T04:15:41.036" v="842" actId="26606"/>
+          <ac:spMkLst>
+            <pc:docMk/>
+            <pc:sldMk cId="3820380717" sldId="258"/>
+            <ac:spMk id="25" creationId="{A9F529C3-C941-49FD-8C67-82F134F64BDB}"/>
+          </ac:spMkLst>
+        </pc:spChg>
+        <pc:spChg chg="add del">
+          <ac:chgData name="Saumitra Gokhale" userId="b6a19a222bcc1af9" providerId="LiveId" clId="{E73EE97B-EF70-4C67-A090-E9F4157C8985}" dt="2025-12-05T04:15:41.036" v="842" actId="26606"/>
+          <ac:spMkLst>
+            <pc:docMk/>
+            <pc:sldMk cId="3820380717" sldId="258"/>
+            <ac:spMk id="26" creationId="{20586029-32A0-47E5-9AEC-AE3ABA6B94D0}"/>
+          </ac:spMkLst>
+        </pc:spChg>
+        <pc:spChg chg="add del">
+          <ac:chgData name="Saumitra Gokhale" userId="b6a19a222bcc1af9" providerId="LiveId" clId="{E73EE97B-EF70-4C67-A090-E9F4157C8985}" dt="2025-12-05T04:21:01.024" v="844" actId="26606"/>
+          <ac:spMkLst>
+            <pc:docMk/>
+            <pc:sldMk cId="3820380717" sldId="258"/>
+            <ac:spMk id="29" creationId="{0205D939-00C4-4F2E-9797-3170DD040D90}"/>
+          </ac:spMkLst>
+        </pc:spChg>
+        <pc:spChg chg="add del">
+          <ac:chgData name="Saumitra Gokhale" userId="b6a19a222bcc1af9" providerId="LiveId" clId="{E73EE97B-EF70-4C67-A090-E9F4157C8985}" dt="2025-12-05T04:21:01.024" v="844" actId="26606"/>
+          <ac:spMkLst>
+            <pc:docMk/>
+            <pc:sldMk cId="3820380717" sldId="258"/>
+            <ac:spMk id="30" creationId="{38EE4E44-1403-472B-8C01-D354CB8F5AE7}"/>
+          </ac:spMkLst>
+        </pc:spChg>
+        <pc:spChg chg="add del">
+          <ac:chgData name="Saumitra Gokhale" userId="b6a19a222bcc1af9" providerId="LiveId" clId="{E73EE97B-EF70-4C67-A090-E9F4157C8985}" dt="2025-12-05T04:21:01.024" v="844" actId="26606"/>
+          <ac:spMkLst>
+            <pc:docMk/>
+            <pc:sldMk cId="3820380717" sldId="258"/>
+            <ac:spMk id="31" creationId="{583CCE40-4C5F-42D3-86D9-7892AD1E98E3}"/>
+          </ac:spMkLst>
+        </pc:spChg>
+        <pc:grpChg chg="del">
+          <ac:chgData name="Saumitra Gokhale" userId="b6a19a222bcc1af9" providerId="LiveId" clId="{E73EE97B-EF70-4C67-A090-E9F4157C8985}" dt="2025-12-05T04:01:43.424" v="737" actId="478"/>
+          <ac:grpSpMkLst>
+            <pc:docMk/>
+            <pc:sldMk cId="3820380717" sldId="258"/>
+            <ac:grpSpMk id="12" creationId="{0B0AFCB8-8774-3547-0DEE-528E480DE74D}"/>
+          </ac:grpSpMkLst>
+        </pc:grpChg>
+        <pc:picChg chg="add del mod">
+          <ac:chgData name="Saumitra Gokhale" userId="b6a19a222bcc1af9" providerId="LiveId" clId="{E73EE97B-EF70-4C67-A090-E9F4157C8985}" dt="2025-12-05T04:11:30.624" v="751" actId="478"/>
+          <ac:picMkLst>
+            <pc:docMk/>
+            <pc:sldMk cId="3820380717" sldId="258"/>
+            <ac:picMk id="4" creationId="{F4A75455-F992-724E-EC27-242F041E85CE}"/>
+          </ac:picMkLst>
+        </pc:picChg>
+        <pc:picChg chg="add del mod ord">
+          <ac:chgData name="Saumitra Gokhale" userId="b6a19a222bcc1af9" providerId="LiveId" clId="{E73EE97B-EF70-4C67-A090-E9F4157C8985}" dt="2025-12-05T04:21:04.114" v="845" actId="478"/>
+          <ac:picMkLst>
+            <pc:docMk/>
+            <pc:sldMk cId="3820380717" sldId="258"/>
+            <ac:picMk id="6" creationId="{6C1144B1-8AF4-9B43-F7F4-5EB8A6B65F3D}"/>
+          </ac:picMkLst>
+        </pc:picChg>
+        <pc:picChg chg="del">
+          <ac:chgData name="Saumitra Gokhale" userId="b6a19a222bcc1af9" providerId="LiveId" clId="{E73EE97B-EF70-4C67-A090-E9F4157C8985}" dt="2025-12-05T04:15:22.050" v="837" actId="478"/>
+          <ac:picMkLst>
+            <pc:docMk/>
+            <pc:sldMk cId="3820380717" sldId="258"/>
+            <ac:picMk id="11" creationId="{4A293A62-A9D8-911D-5797-D5CF90414ABF}"/>
+          </ac:picMkLst>
+        </pc:picChg>
+        <pc:picChg chg="add del mod">
+          <ac:chgData name="Saumitra Gokhale" userId="b6a19a222bcc1af9" providerId="LiveId" clId="{E73EE97B-EF70-4C67-A090-E9F4157C8985}" dt="2025-12-05T04:21:10.386" v="848" actId="478"/>
+          <ac:picMkLst>
+            <pc:docMk/>
+            <pc:sldMk cId="3820380717" sldId="258"/>
+            <ac:picMk id="14" creationId="{F208B65D-AF47-5033-CF58-508CB714E33C}"/>
+          </ac:picMkLst>
+        </pc:picChg>
+        <pc:picChg chg="add del mod">
+          <ac:chgData name="Saumitra Gokhale" userId="b6a19a222bcc1af9" providerId="LiveId" clId="{E73EE97B-EF70-4C67-A090-E9F4157C8985}" dt="2025-12-05T04:28:39.671" v="990" actId="478"/>
+          <ac:picMkLst>
+            <pc:docMk/>
+            <pc:sldMk cId="3820380717" sldId="258"/>
+            <ac:picMk id="16" creationId="{95689AEA-35EC-367C-9FC6-93D4610ACBC0}"/>
+          </ac:picMkLst>
+        </pc:picChg>
+        <pc:picChg chg="add del mod">
+          <ac:chgData name="Saumitra Gokhale" userId="b6a19a222bcc1af9" providerId="LiveId" clId="{E73EE97B-EF70-4C67-A090-E9F4157C8985}" dt="2025-12-05T04:28:49.539" v="1048" actId="478"/>
+          <ac:picMkLst>
+            <pc:docMk/>
+            <pc:sldMk cId="3820380717" sldId="258"/>
+            <ac:picMk id="18" creationId="{BBD60B74-0017-3091-A559-67A31C761461}"/>
+          </ac:picMkLst>
+        </pc:picChg>
+        <pc:picChg chg="add mod">
+          <ac:chgData name="Saumitra Gokhale" userId="b6a19a222bcc1af9" providerId="LiveId" clId="{E73EE97B-EF70-4C67-A090-E9F4157C8985}" dt="2025-12-05T04:28:47.368" v="1047" actId="1037"/>
+          <ac:picMkLst>
+            <pc:docMk/>
+            <pc:sldMk cId="3820380717" sldId="258"/>
+            <ac:picMk id="32" creationId="{CD0E9C07-219B-3865-E558-C171602E0112}"/>
+          </ac:picMkLst>
+        </pc:picChg>
+        <pc:picChg chg="add mod">
+          <ac:chgData name="Saumitra Gokhale" userId="b6a19a222bcc1af9" providerId="LiveId" clId="{E73EE97B-EF70-4C67-A090-E9F4157C8985}" dt="2025-12-05T04:29:34.809" v="1148" actId="1038"/>
+          <ac:picMkLst>
+            <pc:docMk/>
+            <pc:sldMk cId="3820380717" sldId="258"/>
+            <ac:picMk id="34" creationId="{18C833E1-60F3-47F9-0F48-769F1A16F0BB}"/>
+          </ac:picMkLst>
+        </pc:picChg>
+        <pc:cxnChg chg="add del">
+          <ac:chgData name="Saumitra Gokhale" userId="b6a19a222bcc1af9" providerId="LiveId" clId="{E73EE97B-EF70-4C67-A090-E9F4157C8985}" dt="2025-12-05T04:15:41.036" v="842" actId="26606"/>
+          <ac:cxnSpMkLst>
+            <pc:docMk/>
+            <pc:sldMk cId="3820380717" sldId="258"/>
+            <ac:cxnSpMk id="27" creationId="{8C730EAB-A532-4295-A302-FB4B90DB9F5E}"/>
+          </ac:cxnSpMkLst>
+        </pc:cxnChg>
       </pc:sldChg>
       <pc:sldChg chg="modSp modTransition setBg modAnim">
         <pc:chgData name="Saumitra Gokhale" userId="b6a19a222bcc1af9" providerId="LiveId" clId="{E73EE97B-EF70-4C67-A090-E9F4157C8985}" dt="2025-11-28T07:15:50.897" v="628" actId="6549"/>
@@ -166,12 +355,20 @@
           </ac:spMkLst>
         </pc:spChg>
       </pc:sldChg>
-      <pc:sldChg chg="modSp mod modTransition">
-        <pc:chgData name="Saumitra Gokhale" userId="b6a19a222bcc1af9" providerId="LiveId" clId="{E73EE97B-EF70-4C67-A090-E9F4157C8985}" dt="2025-11-28T06:46:43.903" v="543"/>
+      <pc:sldChg chg="addSp delSp modSp mod modTransition">
+        <pc:chgData name="Saumitra Gokhale" userId="b6a19a222bcc1af9" providerId="LiveId" clId="{E73EE97B-EF70-4C67-A090-E9F4157C8985}" dt="2025-12-05T04:31:27.234" v="1154" actId="14100"/>
         <pc:sldMkLst>
           <pc:docMk/>
           <pc:sldMk cId="1431517318" sldId="260"/>
         </pc:sldMkLst>
+        <pc:spChg chg="add del mod">
+          <ac:chgData name="Saumitra Gokhale" userId="b6a19a222bcc1af9" providerId="LiveId" clId="{E73EE97B-EF70-4C67-A090-E9F4157C8985}" dt="2025-12-05T04:31:13.921" v="1150"/>
+          <ac:spMkLst>
+            <pc:docMk/>
+            <pc:sldMk cId="1431517318" sldId="260"/>
+            <ac:spMk id="4" creationId="{3E23C4E8-91FB-CDD7-8637-B708A7D10365}"/>
+          </ac:spMkLst>
+        </pc:spChg>
         <pc:spChg chg="mod">
           <ac:chgData name="Saumitra Gokhale" userId="b6a19a222bcc1af9" providerId="LiveId" clId="{E73EE97B-EF70-4C67-A090-E9F4157C8985}" dt="2025-11-28T06:45:32.652" v="536" actId="20577"/>
           <ac:spMkLst>
@@ -180,6 +377,22 @@
             <ac:spMk id="8" creationId="{4479FCC2-1055-DCEF-4EF4-551AF2576B9D}"/>
           </ac:spMkLst>
         </pc:spChg>
+        <pc:picChg chg="del">
+          <ac:chgData name="Saumitra Gokhale" userId="b6a19a222bcc1af9" providerId="LiveId" clId="{E73EE97B-EF70-4C67-A090-E9F4157C8985}" dt="2025-12-05T04:31:11.841" v="1149" actId="478"/>
+          <ac:picMkLst>
+            <pc:docMk/>
+            <pc:sldMk cId="1431517318" sldId="260"/>
+            <ac:picMk id="5" creationId="{49A5740D-4C82-CE58-63CB-A3FA10DAA5AF}"/>
+          </ac:picMkLst>
+        </pc:picChg>
+        <pc:picChg chg="add mod">
+          <ac:chgData name="Saumitra Gokhale" userId="b6a19a222bcc1af9" providerId="LiveId" clId="{E73EE97B-EF70-4C67-A090-E9F4157C8985}" dt="2025-12-05T04:31:27.234" v="1154" actId="14100"/>
+          <ac:picMkLst>
+            <pc:docMk/>
+            <pc:sldMk cId="1431517318" sldId="260"/>
+            <ac:picMk id="9" creationId="{A1BE6268-3028-B89F-4B15-BBF0815A4CD2}"/>
+          </ac:picMkLst>
+        </pc:picChg>
       </pc:sldChg>
       <pc:sldChg chg="modSp mod modTransition modAnim">
         <pc:chgData name="Saumitra Gokhale" userId="b6a19a222bcc1af9" providerId="LiveId" clId="{E73EE97B-EF70-4C67-A090-E9F4157C8985}" dt="2025-11-28T07:25:53.381" v="736" actId="20577"/>
@@ -250,21 +463,6 @@
             <ac:picMk id="2050" creationId="{A79F507F-621D-F3A6-947A-2D91B450143C}"/>
           </ac:picMkLst>
         </pc:picChg>
-      </pc:sldChg>
-      <pc:sldChg chg="modSp new del">
-        <pc:chgData name="Saumitra Gokhale" userId="b6a19a222bcc1af9" providerId="LiveId" clId="{E73EE97B-EF70-4C67-A090-E9F4157C8985}" dt="2025-11-28T07:24:36.416" v="697" actId="680"/>
-        <pc:sldMkLst>
-          <pc:docMk/>
-          <pc:sldMk cId="1375893160" sldId="263"/>
-        </pc:sldMkLst>
-        <pc:spChg chg="mod">
-          <ac:chgData name="Saumitra Gokhale" userId="b6a19a222bcc1af9" providerId="LiveId" clId="{E73EE97B-EF70-4C67-A090-E9F4157C8985}" dt="2025-11-28T07:24:30.591" v="696"/>
-          <ac:spMkLst>
-            <pc:docMk/>
-            <pc:sldMk cId="1375893160" sldId="263"/>
-            <ac:spMk id="3" creationId="{5897C3E0-A97F-B2AB-D5BE-8711AA67DBB9}"/>
-          </ac:spMkLst>
-        </pc:spChg>
       </pc:sldChg>
       <pc:sldMasterChg chg="setBg modSldLayout">
         <pc:chgData name="Saumitra Gokhale" userId="b6a19a222bcc1af9" providerId="LiveId" clId="{E73EE97B-EF70-4C67-A090-E9F4157C8985}" dt="2025-11-28T06:43:54.911" v="534"/>
@@ -513,7 +711,7 @@
           <a:p>
             <a:fld id="{025BD830-C79B-40E6-B638-1EE41956FB47}" type="datetimeFigureOut">
               <a:rPr lang="en-US" smtClean="0"/>
-              <a:t>11/27/2025</a:t>
+              <a:t>12/4/2025</a:t>
             </a:fld>
             <a:endParaRPr lang="en-US"/>
           </a:p>
@@ -711,7 +909,7 @@
           <a:p>
             <a:fld id="{025BD830-C79B-40E6-B638-1EE41956FB47}" type="datetimeFigureOut">
               <a:rPr lang="en-US" smtClean="0"/>
-              <a:t>11/27/2025</a:t>
+              <a:t>12/4/2025</a:t>
             </a:fld>
             <a:endParaRPr lang="en-US"/>
           </a:p>
@@ -919,7 +1117,7 @@
           <a:p>
             <a:fld id="{025BD830-C79B-40E6-B638-1EE41956FB47}" type="datetimeFigureOut">
               <a:rPr lang="en-US" smtClean="0"/>
-              <a:t>11/27/2025</a:t>
+              <a:t>12/4/2025</a:t>
             </a:fld>
             <a:endParaRPr lang="en-US"/>
           </a:p>
@@ -1117,7 +1315,7 @@
           <a:p>
             <a:fld id="{025BD830-C79B-40E6-B638-1EE41956FB47}" type="datetimeFigureOut">
               <a:rPr lang="en-US" smtClean="0"/>
-              <a:t>11/27/2025</a:t>
+              <a:t>12/4/2025</a:t>
             </a:fld>
             <a:endParaRPr lang="en-US"/>
           </a:p>
@@ -1392,7 +1590,7 @@
           <a:p>
             <a:fld id="{025BD830-C79B-40E6-B638-1EE41956FB47}" type="datetimeFigureOut">
               <a:rPr lang="en-US" smtClean="0"/>
-              <a:t>11/27/2025</a:t>
+              <a:t>12/4/2025</a:t>
             </a:fld>
             <a:endParaRPr lang="en-US"/>
           </a:p>
@@ -1657,7 +1855,7 @@
           <a:p>
             <a:fld id="{025BD830-C79B-40E6-B638-1EE41956FB47}" type="datetimeFigureOut">
               <a:rPr lang="en-US" smtClean="0"/>
-              <a:t>11/27/2025</a:t>
+              <a:t>12/4/2025</a:t>
             </a:fld>
             <a:endParaRPr lang="en-US"/>
           </a:p>
@@ -2069,7 +2267,7 @@
           <a:p>
             <a:fld id="{025BD830-C79B-40E6-B638-1EE41956FB47}" type="datetimeFigureOut">
               <a:rPr lang="en-US" smtClean="0"/>
-              <a:t>11/27/2025</a:t>
+              <a:t>12/4/2025</a:t>
             </a:fld>
             <a:endParaRPr lang="en-US"/>
           </a:p>
@@ -2210,7 +2408,7 @@
           <a:p>
             <a:fld id="{025BD830-C79B-40E6-B638-1EE41956FB47}" type="datetimeFigureOut">
               <a:rPr lang="en-US" smtClean="0"/>
-              <a:t>11/27/2025</a:t>
+              <a:t>12/4/2025</a:t>
             </a:fld>
             <a:endParaRPr lang="en-US"/>
           </a:p>
@@ -2323,7 +2521,7 @@
           <a:p>
             <a:fld id="{025BD830-C79B-40E6-B638-1EE41956FB47}" type="datetimeFigureOut">
               <a:rPr lang="en-US" smtClean="0"/>
-              <a:t>11/27/2025</a:t>
+              <a:t>12/4/2025</a:t>
             </a:fld>
             <a:endParaRPr lang="en-US"/>
           </a:p>
@@ -2634,7 +2832,7 @@
           <a:p>
             <a:fld id="{025BD830-C79B-40E6-B638-1EE41956FB47}" type="datetimeFigureOut">
               <a:rPr lang="en-US" smtClean="0"/>
-              <a:t>11/27/2025</a:t>
+              <a:t>12/4/2025</a:t>
             </a:fld>
             <a:endParaRPr lang="en-US"/>
           </a:p>
@@ -2922,7 +3120,7 @@
           <a:p>
             <a:fld id="{025BD830-C79B-40E6-B638-1EE41956FB47}" type="datetimeFigureOut">
               <a:rPr lang="en-US" smtClean="0"/>
-              <a:t>11/27/2025</a:t>
+              <a:t>12/4/2025</a:t>
             </a:fld>
             <a:endParaRPr lang="en-US"/>
           </a:p>
@@ -3166,7 +3364,7 @@
           <a:p>
             <a:fld id="{025BD830-C79B-40E6-B638-1EE41956FB47}" type="datetimeFigureOut">
               <a:rPr lang="en-US" smtClean="0"/>
-              <a:t>11/27/2025</a:t>
+              <a:t>12/4/2025</a:t>
             </a:fld>
             <a:endParaRPr lang="en-US"/>
           </a:p>
@@ -4235,13 +4433,13 @@
   <p:clrMapOvr>
     <a:masterClrMapping/>
   </p:clrMapOvr>
-  <mc:AlternateContent xmlns:mc="http://schemas.openxmlformats.org/markup-compatibility/2006">
-    <mc:Choice xmlns:p14="http://schemas.microsoft.com/office/powerpoint/2010/main" Requires="p14">
+  <mc:AlternateContent xmlns:mc="http://schemas.openxmlformats.org/markup-compatibility/2006" xmlns:p14="http://schemas.microsoft.com/office/powerpoint/2010/main">
+    <mc:Choice Requires="p14">
       <p:transition spd="slow" p14:dur="800">
         <p:circle/>
       </p:transition>
     </mc:Choice>
-    <mc:Fallback>
+    <mc:Fallback xmlns="">
       <p:transition spd="slow">
         <p:circle/>
       </p:transition>
@@ -4543,13 +4741,13 @@
   <p:clrMapOvr>
     <a:masterClrMapping/>
   </p:clrMapOvr>
-  <mc:AlternateContent xmlns:mc="http://schemas.openxmlformats.org/markup-compatibility/2006">
-    <mc:Choice xmlns:p14="http://schemas.microsoft.com/office/powerpoint/2010/main" Requires="p14">
+  <mc:AlternateContent xmlns:mc="http://schemas.openxmlformats.org/markup-compatibility/2006" xmlns:p14="http://schemas.microsoft.com/office/powerpoint/2010/main">
+    <mc:Choice Requires="p14">
       <p:transition spd="slow" p14:dur="800">
         <p:circle/>
       </p:transition>
     </mc:Choice>
-    <mc:Fallback>
+    <mc:Fallback xmlns="">
       <p:transition spd="slow">
         <p:circle/>
       </p:transition>
@@ -4575,136 +4773,12 @@
           <a:chExt cx="0" cy="0"/>
         </a:xfrm>
       </p:grpSpPr>
-      <p:sp>
-        <p:nvSpPr>
-          <p:cNvPr id="2" name="Title 1">
-            <a:extLst>
-              <a:ext uri="{FF2B5EF4-FFF2-40B4-BE49-F238E27FC236}">
-                <a16:creationId xmlns:a16="http://schemas.microsoft.com/office/drawing/2014/main" id="{40AD334F-5E4D-CF1C-514B-2ABAD736A62A}"/>
-              </a:ext>
-            </a:extLst>
-          </p:cNvPr>
-          <p:cNvSpPr>
-            <a:spLocks noGrp="1"/>
-          </p:cNvSpPr>
-          <p:nvPr>
-            <p:ph type="title"/>
-          </p:nvPr>
-        </p:nvSpPr>
-        <p:spPr>
-          <a:xfrm>
-            <a:off x="838200" y="-161346"/>
-            <a:ext cx="10515600" cy="1325563"/>
-          </a:xfrm>
-        </p:spPr>
-        <p:txBody>
-          <a:bodyPr>
-            <a:normAutofit/>
-          </a:bodyPr>
-          <a:lstStyle/>
-          <a:p>
-            <a:r>
-              <a:rPr lang="en-US" sz="4000" dirty="0"/>
-              <a:t>VSS 2025 – </a:t>
-            </a:r>
-            <a:r>
-              <a:rPr lang="en-US" sz="4000" dirty="0" err="1"/>
-              <a:t>Dinacharya</a:t>
-            </a:r>
-            <a:r>
-              <a:rPr lang="en-US" sz="4000" dirty="0"/>
-              <a:t> (Timetable)</a:t>
-            </a:r>
-          </a:p>
-        </p:txBody>
-      </p:sp>
-      <p:grpSp>
-        <p:nvGrpSpPr>
-          <p:cNvPr id="12" name="Group 11">
-            <a:extLst>
-              <a:ext uri="{FF2B5EF4-FFF2-40B4-BE49-F238E27FC236}">
-                <a16:creationId xmlns:a16="http://schemas.microsoft.com/office/drawing/2014/main" id="{0B0AFCB8-8774-3547-0DEE-528E480DE74D}"/>
-              </a:ext>
-            </a:extLst>
-          </p:cNvPr>
-          <p:cNvGrpSpPr/>
-          <p:nvPr/>
-        </p:nvGrpSpPr>
-        <p:grpSpPr>
-          <a:xfrm>
-            <a:off x="762018" y="1179085"/>
-            <a:ext cx="5333981" cy="5286370"/>
-            <a:chOff x="762019" y="1825625"/>
-            <a:chExt cx="4629388" cy="4704436"/>
-          </a:xfrm>
-        </p:grpSpPr>
-        <p:pic>
-          <p:nvPicPr>
-            <p:cNvPr id="7" name="Picture 6">
-              <a:extLst>
-                <a:ext uri="{FF2B5EF4-FFF2-40B4-BE49-F238E27FC236}">
-                  <a16:creationId xmlns:a16="http://schemas.microsoft.com/office/drawing/2014/main" id="{005E2212-AD3A-A138-ED9A-308284B3DAE3}"/>
-                </a:ext>
-              </a:extLst>
-            </p:cNvPr>
-            <p:cNvPicPr>
-              <a:picLocks noChangeAspect="1"/>
-            </p:cNvPicPr>
-            <p:nvPr/>
-          </p:nvPicPr>
-          <p:blipFill>
-            <a:blip r:embed="rId2"/>
-            <a:stretch>
-              <a:fillRect/>
-            </a:stretch>
-          </p:blipFill>
-          <p:spPr>
-            <a:xfrm>
-              <a:off x="762019" y="1825625"/>
-              <a:ext cx="4629388" cy="1416123"/>
-            </a:xfrm>
-            <a:prstGeom prst="rect">
-              <a:avLst/>
-            </a:prstGeom>
-          </p:spPr>
-        </p:pic>
-        <p:pic>
-          <p:nvPicPr>
-            <p:cNvPr id="9" name="Picture 8">
-              <a:extLst>
-                <a:ext uri="{FF2B5EF4-FFF2-40B4-BE49-F238E27FC236}">
-                  <a16:creationId xmlns:a16="http://schemas.microsoft.com/office/drawing/2014/main" id="{2A96256F-8800-E132-3FEE-B280FA91F54E}"/>
-                </a:ext>
-              </a:extLst>
-            </p:cNvPr>
-            <p:cNvPicPr>
-              <a:picLocks noChangeAspect="1"/>
-            </p:cNvPicPr>
-            <p:nvPr/>
-          </p:nvPicPr>
-          <p:blipFill>
-            <a:blip r:embed="rId3"/>
-            <a:stretch>
-              <a:fillRect/>
-            </a:stretch>
-          </p:blipFill>
-          <p:spPr>
-            <a:xfrm>
-              <a:off x="774720" y="3253293"/>
-              <a:ext cx="4616687" cy="3276768"/>
-            </a:xfrm>
-            <a:prstGeom prst="rect">
-              <a:avLst/>
-            </a:prstGeom>
-          </p:spPr>
-        </p:pic>
-      </p:grpSp>
       <p:pic>
         <p:nvPicPr>
-          <p:cNvPr id="11" name="Picture 10">
-            <a:extLst>
-              <a:ext uri="{FF2B5EF4-FFF2-40B4-BE49-F238E27FC236}">
-                <a16:creationId xmlns:a16="http://schemas.microsoft.com/office/drawing/2014/main" id="{4A293A62-A9D8-911D-5797-D5CF90414ABF}"/>
+          <p:cNvPr id="32" name="Picture 31">
+            <a:extLst>
+              <a:ext uri="{FF2B5EF4-FFF2-40B4-BE49-F238E27FC236}">
+                <a16:creationId xmlns:a16="http://schemas.microsoft.com/office/drawing/2014/main" id="{CD0E9C07-219B-3865-E558-C171602E0112}"/>
               </a:ext>
             </a:extLst>
           </p:cNvPr>
@@ -4714,15 +4788,45 @@
           <p:nvPr/>
         </p:nvPicPr>
         <p:blipFill>
-          <a:blip r:embed="rId4"/>
+          <a:blip r:embed="rId2"/>
           <a:stretch>
             <a:fillRect/>
           </a:stretch>
         </p:blipFill>
         <p:spPr>
           <a:xfrm>
-            <a:off x="6523510" y="1164216"/>
-            <a:ext cx="5319347" cy="3985847"/>
+            <a:off x="1509183" y="285588"/>
+            <a:ext cx="3816546" cy="6286823"/>
+          </a:xfrm>
+          <a:prstGeom prst="rect">
+            <a:avLst/>
+          </a:prstGeom>
+        </p:spPr>
+      </p:pic>
+      <p:pic>
+        <p:nvPicPr>
+          <p:cNvPr id="34" name="Picture 33">
+            <a:extLst>
+              <a:ext uri="{FF2B5EF4-FFF2-40B4-BE49-F238E27FC236}">
+                <a16:creationId xmlns:a16="http://schemas.microsoft.com/office/drawing/2014/main" id="{18C833E1-60F3-47F9-0F48-769F1A16F0BB}"/>
+              </a:ext>
+            </a:extLst>
+          </p:cNvPr>
+          <p:cNvPicPr>
+            <a:picLocks noChangeAspect="1"/>
+          </p:cNvPicPr>
+          <p:nvPr/>
+        </p:nvPicPr>
+        <p:blipFill>
+          <a:blip r:embed="rId3"/>
+          <a:stretch>
+            <a:fillRect/>
+          </a:stretch>
+        </p:blipFill>
+        <p:spPr>
+          <a:xfrm>
+            <a:off x="6728010" y="345092"/>
+            <a:ext cx="3797495" cy="4597636"/>
           </a:xfrm>
           <a:prstGeom prst="rect">
             <a:avLst/>
@@ -4739,13 +4843,13 @@
   <p:clrMapOvr>
     <a:masterClrMapping/>
   </p:clrMapOvr>
-  <mc:AlternateContent xmlns:mc="http://schemas.openxmlformats.org/markup-compatibility/2006">
-    <mc:Choice xmlns:p14="http://schemas.microsoft.com/office/powerpoint/2010/main" Requires="p14">
+  <mc:AlternateContent xmlns:mc="http://schemas.openxmlformats.org/markup-compatibility/2006" xmlns:p14="http://schemas.microsoft.com/office/powerpoint/2010/main">
+    <mc:Choice Requires="p14">
       <p:transition spd="slow" p14:dur="800">
         <p:circle/>
       </p:transition>
     </mc:Choice>
-    <mc:Fallback>
+    <mc:Fallback xmlns="">
       <p:transition spd="slow">
         <p:circle/>
       </p:transition>
@@ -5274,13 +5378,13 @@
   <p:clrMapOvr>
     <a:masterClrMapping/>
   </p:clrMapOvr>
-  <mc:AlternateContent xmlns:mc="http://schemas.openxmlformats.org/markup-compatibility/2006">
-    <mc:Choice xmlns:p14="http://schemas.microsoft.com/office/powerpoint/2010/main" Requires="p14">
+  <mc:AlternateContent xmlns:mc="http://schemas.openxmlformats.org/markup-compatibility/2006" xmlns:p14="http://schemas.microsoft.com/office/powerpoint/2010/main">
+    <mc:Choice Requires="p14">
       <p:transition spd="slow" p14:dur="800">
         <p:circle/>
       </p:transition>
     </mc:Choice>
-    <mc:Fallback>
+    <mc:Fallback xmlns="">
       <p:transition spd="slow">
         <p:circle/>
       </p:transition>
@@ -6251,13 +6355,13 @@
   <p:clrMapOvr>
     <a:masterClrMapping/>
   </p:clrMapOvr>
-  <mc:AlternateContent xmlns:mc="http://schemas.openxmlformats.org/markup-compatibility/2006">
-    <mc:Choice xmlns:p14="http://schemas.microsoft.com/office/powerpoint/2010/main" Requires="p14">
+  <mc:AlternateContent xmlns:mc="http://schemas.openxmlformats.org/markup-compatibility/2006" xmlns:p14="http://schemas.microsoft.com/office/powerpoint/2010/main">
+    <mc:Choice Requires="p14">
       <p:transition spd="slow" p14:dur="800">
         <p:circle/>
       </p:transition>
     </mc:Choice>
-    <mc:Fallback>
+    <mc:Fallback xmlns="">
       <p:transition spd="slow">
         <p:circle/>
       </p:transition>
@@ -6323,41 +6427,6 @@
       </p:sp>
       <p:pic>
         <p:nvPicPr>
-          <p:cNvPr id="5" name="Content Placeholder 4" descr="A person and person in white robes&#10;&#10;AI-generated content may be incorrect.">
-            <a:extLst>
-              <a:ext uri="{FF2B5EF4-FFF2-40B4-BE49-F238E27FC236}">
-                <a16:creationId xmlns:a16="http://schemas.microsoft.com/office/drawing/2014/main" id="{49A5740D-4C82-CE58-63CB-A3FA10DAA5AF}"/>
-              </a:ext>
-            </a:extLst>
-          </p:cNvPr>
-          <p:cNvPicPr>
-            <a:picLocks noGrp="1" noChangeAspect="1"/>
-          </p:cNvPicPr>
-          <p:nvPr>
-            <p:ph idx="1"/>
-          </p:nvPr>
-        </p:nvPicPr>
-        <p:blipFill>
-          <a:blip r:embed="rId2">
-            <a:extLst>
-              <a:ext uri="{28A0092B-C50C-407E-A947-70E740481C1C}">
-                <a14:useLocalDpi xmlns:a14="http://schemas.microsoft.com/office/drawing/2010/main" val="0"/>
-              </a:ext>
-            </a:extLst>
-          </a:blip>
-          <a:stretch>
-            <a:fillRect/>
-          </a:stretch>
-        </p:blipFill>
-        <p:spPr>
-          <a:xfrm>
-            <a:off x="236204" y="1253331"/>
-            <a:ext cx="3107132" cy="4662520"/>
-          </a:xfrm>
-        </p:spPr>
-      </p:pic>
-      <p:pic>
-        <p:nvPicPr>
           <p:cNvPr id="7" name="Picture 6" descr="A person in a white dress&#10;&#10;AI-generated content may be incorrect.">
             <a:extLst>
               <a:ext uri="{FF2B5EF4-FFF2-40B4-BE49-F238E27FC236}">
@@ -6371,7 +6440,7 @@
           <p:nvPr/>
         </p:nvPicPr>
         <p:blipFill>
-          <a:blip r:embed="rId3">
+          <a:blip r:embed="rId2">
             <a:extLst>
               <a:ext uri="{28A0092B-C50C-407E-A947-70E740481C1C}">
                 <a14:useLocalDpi xmlns:a14="http://schemas.microsoft.com/office/drawing/2010/main" val="0"/>
@@ -6649,6 +6718,41 @@
           </a:p>
         </p:txBody>
       </p:sp>
+      <p:pic>
+        <p:nvPicPr>
+          <p:cNvPr id="9" name="Content Placeholder 8" descr="A person and person standing together&#10;&#10;AI-generated content may be incorrect.">
+            <a:extLst>
+              <a:ext uri="{FF2B5EF4-FFF2-40B4-BE49-F238E27FC236}">
+                <a16:creationId xmlns:a16="http://schemas.microsoft.com/office/drawing/2014/main" id="{A1BE6268-3028-B89F-4B15-BBF0815A4CD2}"/>
+              </a:ext>
+            </a:extLst>
+          </p:cNvPr>
+          <p:cNvPicPr>
+            <a:picLocks noGrp="1" noChangeAspect="1"/>
+          </p:cNvPicPr>
+          <p:nvPr>
+            <p:ph idx="1"/>
+          </p:nvPr>
+        </p:nvPicPr>
+        <p:blipFill>
+          <a:blip r:embed="rId3">
+            <a:extLst>
+              <a:ext uri="{28A0092B-C50C-407E-A947-70E740481C1C}">
+                <a14:useLocalDpi xmlns:a14="http://schemas.microsoft.com/office/drawing/2010/main" val="0"/>
+              </a:ext>
+            </a:extLst>
+          </a:blip>
+          <a:stretch>
+            <a:fillRect/>
+          </a:stretch>
+        </p:blipFill>
+        <p:spPr>
+          <a:xfrm>
+            <a:off x="217629" y="1129501"/>
+            <a:ext cx="3089326" cy="4633989"/>
+          </a:xfrm>
+        </p:spPr>
+      </p:pic>
     </p:spTree>
     <p:extLst>
       <p:ext uri="{BB962C8B-B14F-4D97-AF65-F5344CB8AC3E}">
@@ -6659,13 +6763,13 @@
   <p:clrMapOvr>
     <a:masterClrMapping/>
   </p:clrMapOvr>
-  <mc:AlternateContent xmlns:mc="http://schemas.openxmlformats.org/markup-compatibility/2006">
-    <mc:Choice xmlns:p14="http://schemas.microsoft.com/office/powerpoint/2010/main" Requires="p14">
+  <mc:AlternateContent xmlns:mc="http://schemas.openxmlformats.org/markup-compatibility/2006" xmlns:p14="http://schemas.microsoft.com/office/powerpoint/2010/main">
+    <mc:Choice Requires="p14">
       <p:transition spd="slow" p14:dur="800">
         <p:circle/>
       </p:transition>
     </mc:Choice>
-    <mc:Fallback>
+    <mc:Fallback xmlns="">
       <p:transition spd="slow">
         <p:circle/>
       </p:transition>
@@ -6855,13 +6959,13 @@
   <p:clrMapOvr>
     <a:masterClrMapping/>
   </p:clrMapOvr>
-  <mc:AlternateContent xmlns:mc="http://schemas.openxmlformats.org/markup-compatibility/2006">
-    <mc:Choice xmlns:p14="http://schemas.microsoft.com/office/powerpoint/2010/main" Requires="p14">
+  <mc:AlternateContent xmlns:mc="http://schemas.openxmlformats.org/markup-compatibility/2006" xmlns:p14="http://schemas.microsoft.com/office/powerpoint/2010/main">
+    <mc:Choice Requires="p14">
       <p:transition spd="slow" p14:dur="800">
         <p:circle/>
       </p:transition>
     </mc:Choice>
-    <mc:Fallback>
+    <mc:Fallback xmlns="">
       <p:transition spd="slow">
         <p:circle/>
       </p:transition>

</xml_diff>